<commit_message>
make the chart height smaller
</commit_message>
<xml_diff>
--- a/docs/Forge-Poker-Intro.pptx
+++ b/docs/Forge-Poker-Intro.pptx
@@ -293,7 +293,7 @@
           <a:p>
             <a:fld id="{02B2DE31-FAC5-4741-AA55-BCA93587DC95}" type="datetimeFigureOut">
               <a:rPr lang="en-US" smtClean="0"/>
-              <a:t>10/11/2012</a:t>
+              <a:t>11/23/2012</a:t>
             </a:fld>
             <a:endParaRPr lang="en-US"/>
           </a:p>
@@ -463,7 +463,7 @@
           <a:p>
             <a:fld id="{02B2DE31-FAC5-4741-AA55-BCA93587DC95}" type="datetimeFigureOut">
               <a:rPr lang="en-US" smtClean="0"/>
-              <a:t>10/11/2012</a:t>
+              <a:t>11/23/2012</a:t>
             </a:fld>
             <a:endParaRPr lang="en-US"/>
           </a:p>
@@ -643,7 +643,7 @@
           <a:p>
             <a:fld id="{02B2DE31-FAC5-4741-AA55-BCA93587DC95}" type="datetimeFigureOut">
               <a:rPr lang="en-US" smtClean="0"/>
-              <a:t>10/11/2012</a:t>
+              <a:t>11/23/2012</a:t>
             </a:fld>
             <a:endParaRPr lang="en-US"/>
           </a:p>
@@ -813,7 +813,7 @@
           <a:p>
             <a:fld id="{02B2DE31-FAC5-4741-AA55-BCA93587DC95}" type="datetimeFigureOut">
               <a:rPr lang="en-US" smtClean="0"/>
-              <a:t>10/11/2012</a:t>
+              <a:t>11/23/2012</a:t>
             </a:fld>
             <a:endParaRPr lang="en-US"/>
           </a:p>
@@ -1059,7 +1059,7 @@
           <a:p>
             <a:fld id="{02B2DE31-FAC5-4741-AA55-BCA93587DC95}" type="datetimeFigureOut">
               <a:rPr lang="en-US" smtClean="0"/>
-              <a:t>10/11/2012</a:t>
+              <a:t>11/23/2012</a:t>
             </a:fld>
             <a:endParaRPr lang="en-US"/>
           </a:p>
@@ -1347,7 +1347,7 @@
           <a:p>
             <a:fld id="{02B2DE31-FAC5-4741-AA55-BCA93587DC95}" type="datetimeFigureOut">
               <a:rPr lang="en-US" smtClean="0"/>
-              <a:t>10/11/2012</a:t>
+              <a:t>11/23/2012</a:t>
             </a:fld>
             <a:endParaRPr lang="en-US"/>
           </a:p>
@@ -1769,7 +1769,7 @@
           <a:p>
             <a:fld id="{02B2DE31-FAC5-4741-AA55-BCA93587DC95}" type="datetimeFigureOut">
               <a:rPr lang="en-US" smtClean="0"/>
-              <a:t>10/11/2012</a:t>
+              <a:t>11/23/2012</a:t>
             </a:fld>
             <a:endParaRPr lang="en-US"/>
           </a:p>
@@ -1887,7 +1887,7 @@
           <a:p>
             <a:fld id="{02B2DE31-FAC5-4741-AA55-BCA93587DC95}" type="datetimeFigureOut">
               <a:rPr lang="en-US" smtClean="0"/>
-              <a:t>10/11/2012</a:t>
+              <a:t>11/23/2012</a:t>
             </a:fld>
             <a:endParaRPr lang="en-US"/>
           </a:p>
@@ -1982,7 +1982,7 @@
           <a:p>
             <a:fld id="{02B2DE31-FAC5-4741-AA55-BCA93587DC95}" type="datetimeFigureOut">
               <a:rPr lang="en-US" smtClean="0"/>
-              <a:t>10/11/2012</a:t>
+              <a:t>11/23/2012</a:t>
             </a:fld>
             <a:endParaRPr lang="en-US"/>
           </a:p>
@@ -2259,7 +2259,7 @@
           <a:p>
             <a:fld id="{02B2DE31-FAC5-4741-AA55-BCA93587DC95}" type="datetimeFigureOut">
               <a:rPr lang="en-US" smtClean="0"/>
-              <a:t>10/11/2012</a:t>
+              <a:t>11/23/2012</a:t>
             </a:fld>
             <a:endParaRPr lang="en-US"/>
           </a:p>
@@ -2512,7 +2512,7 @@
           <a:p>
             <a:fld id="{02B2DE31-FAC5-4741-AA55-BCA93587DC95}" type="datetimeFigureOut">
               <a:rPr lang="en-US" smtClean="0"/>
-              <a:t>10/11/2012</a:t>
+              <a:t>11/23/2012</a:t>
             </a:fld>
             <a:endParaRPr lang="en-US"/>
           </a:p>
@@ -2725,7 +2725,7 @@
           <a:p>
             <a:fld id="{02B2DE31-FAC5-4741-AA55-BCA93587DC95}" type="datetimeFigureOut">
               <a:rPr lang="en-US" smtClean="0"/>
-              <a:t>10/11/2012</a:t>
+              <a:t>11/23/2012</a:t>
             </a:fld>
             <a:endParaRPr lang="en-US"/>
           </a:p>
@@ -3469,8 +3469,17 @@
             <a:pPr lvl="1"/>
             <a:r>
               <a:rPr lang="en-US" dirty="0" smtClean="0"/>
-              <a:t>HTML5/CSS/JS</a:t>
-            </a:r>
+              <a:t>HTML5 </a:t>
+            </a:r>
+            <a:r>
+              <a:rPr lang="en-US" dirty="0"/>
+              <a:t>C</a:t>
+            </a:r>
+            <a:r>
+              <a:rPr lang="en-US" dirty="0" smtClean="0"/>
+              <a:t>anvas/CSS/JS</a:t>
+            </a:r>
+            <a:endParaRPr lang="en-US" dirty="0" smtClean="0"/>
           </a:p>
           <a:p>
             <a:pPr lvl="1"/>
@@ -3491,8 +3500,8 @@
               <a:t>/paper.js, </a:t>
             </a:r>
             <a:r>
-              <a:rPr lang="en-US" dirty="0" err="1" smtClean="0"/>
-              <a:t>etc</a:t>
+              <a:rPr lang="en-US" dirty="0" smtClean="0"/>
+              <a:t>etc.</a:t>
             </a:r>
             <a:endParaRPr lang="en-US" dirty="0" smtClean="0"/>
           </a:p>

</xml_diff>